<commit_message>
Load menu items for a cafe and display
</commit_message>
<xml_diff>
--- a/ACS_3909_ProjectPPT.pptx
+++ b/ACS_3909_ProjectPPT.pptx
@@ -9863,7 +9863,7 @@
         <p:spPr>
           <a:xfrm>
             <a:off x="690467" y="899118"/>
-            <a:ext cx="11000790" cy="4154984"/>
+            <a:ext cx="11000790" cy="4524315"/>
           </a:xfrm>
           <a:prstGeom prst="rect">
             <a:avLst/>
@@ -9952,10 +9952,18 @@
               <a:buAutoNum type="arabicPeriod"/>
             </a:pPr>
             <a:r>
-              <a:rPr lang="en-CA" sz="2400"/>
+              <a:rPr lang="en-CA" sz="2400" dirty="0"/>
               <a:t>Templates.  </a:t>
             </a:r>
-            <a:endParaRPr lang="en-CA" sz="2400" dirty="0"/>
+          </a:p>
+          <a:p>
+            <a:pPr marL="342900" indent="-342900">
+              <a:buAutoNum type="arabicPeriod"/>
+            </a:pPr>
+            <a:r>
+              <a:rPr lang="en-CA" sz="2400" dirty="0"/>
+              <a:t>MongoDB </a:t>
+            </a:r>
           </a:p>
         </p:txBody>
       </p:sp>

</xml_diff>